<commit_message>
adding new working version
VERSION 2 appears in the slide now
</commit_message>
<xml_diff>
--- a/docs/InnerSource definition.pptx
+++ b/docs/InnerSource definition.pptx
@@ -583,7 +583,7 @@
           <a:p>
             <a:fld id="{35E02854-A06E-468A-B6C8-B9E1335E9383}" type="datetimeFigureOut">
               <a:rPr lang="fr-FR" smtClean="0"/>
-              <a:t>12/10/2022</a:t>
+              <a:t>19/02/2023</a:t>
             </a:fld>
             <a:endParaRPr lang="fr-FR"/>
           </a:p>
@@ -748,7 +748,7 @@
           <a:p>
             <a:fld id="{DF7D062F-3C8C-1446-AA77-5BCD081F008D}" type="datetimeFigureOut">
               <a:rPr lang="fr-FR" smtClean="0"/>
-              <a:t>12/10/2022</a:t>
+              <a:t>19/02/2023</a:t>
             </a:fld>
             <a:endParaRPr lang="en-US"/>
           </a:p>
@@ -1545,12 +1545,20 @@
           <a:p>
             <a:pPr marL="7620" lvl="1" algn="ctr"/>
             <a:r>
+              <a:rPr lang="en-US" sz="2800" i="1">
+                <a:solidFill>
+                  <a:srgbClr val="002D67"/>
+                </a:solidFill>
+              </a:rPr>
+              <a:t>VERSION 2 Inner </a:t>
+            </a:r>
+            <a:r>
               <a:rPr lang="en-US" sz="2800" i="1" dirty="0">
                 <a:solidFill>
                   <a:srgbClr val="002D67"/>
                 </a:solidFill>
               </a:rPr>
-              <a:t>Inner Source is the establishment of</a:t>
+              <a:t>Source is the establishment of</a:t>
             </a:r>
           </a:p>
           <a:p>
@@ -2882,26 +2890,6 @@
 </file>
 
 <file path=customXml/item1.xml><?xml version="1.0" encoding="utf-8"?>
-<p:properties xmlns:p="http://schemas.microsoft.com/office/2006/metadata/properties" xmlns:xsi="http://www.w3.org/2001/XMLSchema-instance" xmlns:pc="http://schemas.microsoft.com/office/infopath/2007/PartnerControls">
-  <documentManagement>
-    <lcf76f155ced4ddcb4097134ff3c332f xmlns="ae28f11b-d4f1-47fe-837d-5da7d4fdfa8d">
-      <Terms xmlns="http://schemas.microsoft.com/office/infopath/2007/PartnerControls"/>
-    </lcf76f155ced4ddcb4097134ff3c332f>
-    <TaxCatchAll xmlns="2e054d75-df43-4e50-a610-0e7b0816d11a" xsi:nil="true"/>
-  </documentManagement>
-</p:properties>
-</file>
-
-<file path=customXml/item2.xml><?xml version="1.0" encoding="utf-8"?>
-<?mso-contentType ?>
-<FormTemplates xmlns="http://schemas.microsoft.com/sharepoint/v3/contenttype/forms">
-  <Display>DocumentLibraryForm</Display>
-  <Edit>DocumentLibraryForm</Edit>
-  <New>DocumentLibraryForm</New>
-</FormTemplates>
-</file>
-
-<file path=customXml/item3.xml><?xml version="1.0" encoding="utf-8"?>
 <ct:contentTypeSchema xmlns:ct="http://schemas.microsoft.com/office/2006/metadata/contentType" xmlns:ma="http://schemas.microsoft.com/office/2006/metadata/properties/metaAttributes" ct:_="" ma:_="" ma:contentTypeName="Document" ma:contentTypeID="0x01010043095EDE67814541926D3AC5F9ACC08F" ma:contentTypeVersion="12" ma:contentTypeDescription="Crée un document." ma:contentTypeScope="" ma:versionID="4740bcd7563aace758bb5af16567afb8">
   <xsd:schema xmlns:xsd="http://www.w3.org/2001/XMLSchema" xmlns:xs="http://www.w3.org/2001/XMLSchema" xmlns:p="http://schemas.microsoft.com/office/2006/metadata/properties" xmlns:ns2="ae28f11b-d4f1-47fe-837d-5da7d4fdfa8d" xmlns:ns3="2e054d75-df43-4e50-a610-0e7b0816d11a" targetNamespace="http://schemas.microsoft.com/office/2006/metadata/properties" ma:root="true" ma:fieldsID="0c540144d36b116ed9070dbfae6023f7" ns2:_="" ns3:_="">
     <xsd:import namespace="ae28f11b-d4f1-47fe-837d-5da7d4fdfa8d"/>
@@ -3118,11 +3106,41 @@
 </ct:contentTypeSchema>
 </file>
 
+<file path=customXml/item2.xml><?xml version="1.0" encoding="utf-8"?>
+<?mso-contentType ?>
+<FormTemplates xmlns="http://schemas.microsoft.com/sharepoint/v3/contenttype/forms">
+  <Display>DocumentLibraryForm</Display>
+  <Edit>DocumentLibraryForm</Edit>
+  <New>DocumentLibraryForm</New>
+</FormTemplates>
+</file>
+
+<file path=customXml/item3.xml><?xml version="1.0" encoding="utf-8"?>
+<p:properties xmlns:p="http://schemas.microsoft.com/office/2006/metadata/properties" xmlns:xsi="http://www.w3.org/2001/XMLSchema-instance" xmlns:pc="http://schemas.microsoft.com/office/infopath/2007/PartnerControls">
+  <documentManagement>
+    <lcf76f155ced4ddcb4097134ff3c332f xmlns="ae28f11b-d4f1-47fe-837d-5da7d4fdfa8d">
+      <Terms xmlns="http://schemas.microsoft.com/office/infopath/2007/PartnerControls"/>
+    </lcf76f155ced4ddcb4097134ff3c332f>
+    <TaxCatchAll xmlns="2e054d75-df43-4e50-a610-0e7b0816d11a" xsi:nil="true"/>
+  </documentManagement>
+</p:properties>
+</file>
+
 <file path=customXml/itemProps1.xml><?xml version="1.0" encoding="utf-8"?>
-<ds:datastoreItem xmlns:ds="http://schemas.openxmlformats.org/officeDocument/2006/customXml" ds:itemID="{21B752BF-03FA-4564-BA24-51321C3466E7}">
+<ds:datastoreItem xmlns:ds="http://schemas.openxmlformats.org/officeDocument/2006/customXml" ds:itemID="{C1F9BB87-C71E-4849-9523-E59F7F2A5EBB}">
   <ds:schemaRefs>
+    <ds:schemaRef ds:uri="http://schemas.microsoft.com/office/2006/metadata/contentType"/>
+    <ds:schemaRef ds:uri="http://schemas.microsoft.com/office/2006/metadata/properties/metaAttributes"/>
+    <ds:schemaRef ds:uri="http://www.w3.org/2001/XMLSchema"/>
     <ds:schemaRef ds:uri="http://schemas.microsoft.com/office/2006/metadata/properties"/>
+    <ds:schemaRef ds:uri="ae28f11b-d4f1-47fe-837d-5da7d4fdfa8d"/>
+    <ds:schemaRef ds:uri="2e054d75-df43-4e50-a610-0e7b0816d11a"/>
+    <ds:schemaRef ds:uri="http://schemas.microsoft.com/office/2006/documentManagement/types"/>
     <ds:schemaRef ds:uri="http://schemas.microsoft.com/office/infopath/2007/PartnerControls"/>
+    <ds:schemaRef ds:uri="http://schemas.openxmlformats.org/package/2006/metadata/core-properties"/>
+    <ds:schemaRef ds:uri="http://purl.org/dc/elements/1.1/"/>
+    <ds:schemaRef ds:uri="http://purl.org/dc/terms/"/>
+    <ds:schemaRef ds:uri="http://schemas.microsoft.com/internal/obd"/>
   </ds:schemaRefs>
 </ds:datastoreItem>
 </file>
@@ -3136,5 +3154,12 @@
 </file>
 
 <file path=customXml/itemProps3.xml><?xml version="1.0" encoding="utf-8"?>
-<ds:datastoreItem xmlns:ds="http://schemas.openxmlformats.org/officeDocument/2006/customXml" ds:itemID="{C1F9BB87-C71E-4849-9523-E59F7F2A5EBB}"/>
+<ds:datastoreItem xmlns:ds="http://schemas.openxmlformats.org/officeDocument/2006/customXml" ds:itemID="{21B752BF-03FA-4564-BA24-51321C3466E7}">
+  <ds:schemaRefs>
+    <ds:schemaRef ds:uri="http://schemas.microsoft.com/office/2006/metadata/properties"/>
+    <ds:schemaRef ds:uri="http://schemas.microsoft.com/office/infopath/2007/PartnerControls"/>
+    <ds:schemaRef ds:uri="ae28f11b-d4f1-47fe-837d-5da7d4fdfa8d"/>
+    <ds:schemaRef ds:uri="2e054d75-df43-4e50-a610-0e7b0816d11a"/>
+  </ds:schemaRefs>
+</ds:datastoreItem>
 </file>
</xml_diff>

<commit_message>
new version of the doc to test PR
</commit_message>
<xml_diff>
--- a/docs/InnerSource definition.pptx
+++ b/docs/InnerSource definition.pptx
@@ -1550,7 +1550,7 @@
                   <a:srgbClr val="002D67"/>
                 </a:solidFill>
               </a:rPr>
-              <a:t>VERSION 2 Inner </a:t>
+              <a:t>VERSION 3 FOR PR </a:t>
             </a:r>
             <a:r>
               <a:rPr lang="en-US" sz="2800" i="1" dirty="0">
@@ -1558,7 +1558,7 @@
                   <a:srgbClr val="002D67"/>
                 </a:solidFill>
               </a:rPr>
-              <a:t>Source is the establishment of</a:t>
+              <a:t>Inner Source is the establishment of</a:t>
             </a:r>
           </a:p>
           <a:p>
@@ -2890,6 +2890,26 @@
 </file>
 
 <file path=customXml/item1.xml><?xml version="1.0" encoding="utf-8"?>
+<p:properties xmlns:p="http://schemas.microsoft.com/office/2006/metadata/properties" xmlns:xsi="http://www.w3.org/2001/XMLSchema-instance" xmlns:pc="http://schemas.microsoft.com/office/infopath/2007/PartnerControls">
+  <documentManagement>
+    <lcf76f155ced4ddcb4097134ff3c332f xmlns="ae28f11b-d4f1-47fe-837d-5da7d4fdfa8d">
+      <Terms xmlns="http://schemas.microsoft.com/office/infopath/2007/PartnerControls"/>
+    </lcf76f155ced4ddcb4097134ff3c332f>
+    <TaxCatchAll xmlns="2e054d75-df43-4e50-a610-0e7b0816d11a" xsi:nil="true"/>
+  </documentManagement>
+</p:properties>
+</file>
+
+<file path=customXml/item2.xml><?xml version="1.0" encoding="utf-8"?>
+<?mso-contentType ?>
+<FormTemplates xmlns="http://schemas.microsoft.com/sharepoint/v3/contenttype/forms">
+  <Display>DocumentLibraryForm</Display>
+  <Edit>DocumentLibraryForm</Edit>
+  <New>DocumentLibraryForm</New>
+</FormTemplates>
+</file>
+
+<file path=customXml/item3.xml><?xml version="1.0" encoding="utf-8"?>
 <ct:contentTypeSchema xmlns:ct="http://schemas.microsoft.com/office/2006/metadata/contentType" xmlns:ma="http://schemas.microsoft.com/office/2006/metadata/properties/metaAttributes" ct:_="" ma:_="" ma:contentTypeName="Document" ma:contentTypeID="0x01010043095EDE67814541926D3AC5F9ACC08F" ma:contentTypeVersion="12" ma:contentTypeDescription="Crée un document." ma:contentTypeScope="" ma:versionID="4740bcd7563aace758bb5af16567afb8">
   <xsd:schema xmlns:xsd="http://www.w3.org/2001/XMLSchema" xmlns:xs="http://www.w3.org/2001/XMLSchema" xmlns:p="http://schemas.microsoft.com/office/2006/metadata/properties" xmlns:ns2="ae28f11b-d4f1-47fe-837d-5da7d4fdfa8d" xmlns:ns3="2e054d75-df43-4e50-a610-0e7b0816d11a" targetNamespace="http://schemas.microsoft.com/office/2006/metadata/properties" ma:root="true" ma:fieldsID="0c540144d36b116ed9070dbfae6023f7" ns2:_="" ns3:_="">
     <xsd:import namespace="ae28f11b-d4f1-47fe-837d-5da7d4fdfa8d"/>
@@ -3106,27 +3126,26 @@
 </ct:contentTypeSchema>
 </file>
 
-<file path=customXml/item2.xml><?xml version="1.0" encoding="utf-8"?>
-<?mso-contentType ?>
-<FormTemplates xmlns="http://schemas.microsoft.com/sharepoint/v3/contenttype/forms">
-  <Display>DocumentLibraryForm</Display>
-  <Edit>DocumentLibraryForm</Edit>
-  <New>DocumentLibraryForm</New>
-</FormTemplates>
+<file path=customXml/itemProps1.xml><?xml version="1.0" encoding="utf-8"?>
+<ds:datastoreItem xmlns:ds="http://schemas.openxmlformats.org/officeDocument/2006/customXml" ds:itemID="{21B752BF-03FA-4564-BA24-51321C3466E7}">
+  <ds:schemaRefs>
+    <ds:schemaRef ds:uri="http://schemas.microsoft.com/office/2006/metadata/properties"/>
+    <ds:schemaRef ds:uri="http://schemas.microsoft.com/office/infopath/2007/PartnerControls"/>
+    <ds:schemaRef ds:uri="ae28f11b-d4f1-47fe-837d-5da7d4fdfa8d"/>
+    <ds:schemaRef ds:uri="2e054d75-df43-4e50-a610-0e7b0816d11a"/>
+  </ds:schemaRefs>
+</ds:datastoreItem>
 </file>
 
-<file path=customXml/item3.xml><?xml version="1.0" encoding="utf-8"?>
-<p:properties xmlns:p="http://schemas.microsoft.com/office/2006/metadata/properties" xmlns:xsi="http://www.w3.org/2001/XMLSchema-instance" xmlns:pc="http://schemas.microsoft.com/office/infopath/2007/PartnerControls">
-  <documentManagement>
-    <lcf76f155ced4ddcb4097134ff3c332f xmlns="ae28f11b-d4f1-47fe-837d-5da7d4fdfa8d">
-      <Terms xmlns="http://schemas.microsoft.com/office/infopath/2007/PartnerControls"/>
-    </lcf76f155ced4ddcb4097134ff3c332f>
-    <TaxCatchAll xmlns="2e054d75-df43-4e50-a610-0e7b0816d11a" xsi:nil="true"/>
-  </documentManagement>
-</p:properties>
+<file path=customXml/itemProps2.xml><?xml version="1.0" encoding="utf-8"?>
+<ds:datastoreItem xmlns:ds="http://schemas.openxmlformats.org/officeDocument/2006/customXml" ds:itemID="{ED026018-9ACA-47BF-A58E-3BEC3F101902}">
+  <ds:schemaRefs>
+    <ds:schemaRef ds:uri="http://schemas.microsoft.com/sharepoint/v3/contenttype/forms"/>
+  </ds:schemaRefs>
+</ds:datastoreItem>
 </file>
 
-<file path=customXml/itemProps1.xml><?xml version="1.0" encoding="utf-8"?>
+<file path=customXml/itemProps3.xml><?xml version="1.0" encoding="utf-8"?>
 <ds:datastoreItem xmlns:ds="http://schemas.openxmlformats.org/officeDocument/2006/customXml" ds:itemID="{C1F9BB87-C71E-4849-9523-E59F7F2A5EBB}">
   <ds:schemaRefs>
     <ds:schemaRef ds:uri="http://schemas.microsoft.com/office/2006/metadata/contentType"/>
@@ -3143,23 +3162,4 @@
     <ds:schemaRef ds:uri="http://schemas.microsoft.com/internal/obd"/>
   </ds:schemaRefs>
 </ds:datastoreItem>
-</file>
-
-<file path=customXml/itemProps2.xml><?xml version="1.0" encoding="utf-8"?>
-<ds:datastoreItem xmlns:ds="http://schemas.openxmlformats.org/officeDocument/2006/customXml" ds:itemID="{ED026018-9ACA-47BF-A58E-3BEC3F101902}">
-  <ds:schemaRefs>
-    <ds:schemaRef ds:uri="http://schemas.microsoft.com/sharepoint/v3/contenttype/forms"/>
-  </ds:schemaRefs>
-</ds:datastoreItem>
-</file>
-
-<file path=customXml/itemProps3.xml><?xml version="1.0" encoding="utf-8"?>
-<ds:datastoreItem xmlns:ds="http://schemas.openxmlformats.org/officeDocument/2006/customXml" ds:itemID="{21B752BF-03FA-4564-BA24-51321C3466E7}">
-  <ds:schemaRefs>
-    <ds:schemaRef ds:uri="http://schemas.microsoft.com/office/2006/metadata/properties"/>
-    <ds:schemaRef ds:uri="http://schemas.microsoft.com/office/infopath/2007/PartnerControls"/>
-    <ds:schemaRef ds:uri="ae28f11b-d4f1-47fe-837d-5da7d4fdfa8d"/>
-    <ds:schemaRef ds:uri="2e054d75-df43-4e50-a610-0e7b0816d11a"/>
-  </ds:schemaRefs>
-</ds:datastoreItem>
 </file>
</xml_diff>